<commit_message>
master: All pages compatible with all resolutions till the quiz part.
</commit_message>
<xml_diff>
--- a/Misc Files/food 1.pptx
+++ b/Misc Files/food 1.pptx
@@ -269,7 +269,7 @@
           <a:p>
             <a:fld id="{A4CFDB1A-A5DF-4B07-9E87-D30DEF3E7E1E}" type="datetimeFigureOut">
               <a:rPr lang="en-US" smtClean="0"/>
-              <a:t>8/14/2020</a:t>
+              <a:t>8/21/2020</a:t>
             </a:fld>
             <a:endParaRPr lang="en-US"/>
           </a:p>
@@ -439,7 +439,7 @@
           <a:p>
             <a:fld id="{A4CFDB1A-A5DF-4B07-9E87-D30DEF3E7E1E}" type="datetimeFigureOut">
               <a:rPr lang="en-US" smtClean="0"/>
-              <a:t>8/14/2020</a:t>
+              <a:t>8/21/2020</a:t>
             </a:fld>
             <a:endParaRPr lang="en-US"/>
           </a:p>
@@ -619,7 +619,7 @@
           <a:p>
             <a:fld id="{A4CFDB1A-A5DF-4B07-9E87-D30DEF3E7E1E}" type="datetimeFigureOut">
               <a:rPr lang="en-US" smtClean="0"/>
-              <a:t>8/14/2020</a:t>
+              <a:t>8/21/2020</a:t>
             </a:fld>
             <a:endParaRPr lang="en-US"/>
           </a:p>
@@ -789,7 +789,7 @@
           <a:p>
             <a:fld id="{A4CFDB1A-A5DF-4B07-9E87-D30DEF3E7E1E}" type="datetimeFigureOut">
               <a:rPr lang="en-US" smtClean="0"/>
-              <a:t>8/14/2020</a:t>
+              <a:t>8/21/2020</a:t>
             </a:fld>
             <a:endParaRPr lang="en-US"/>
           </a:p>
@@ -1033,7 +1033,7 @@
           <a:p>
             <a:fld id="{A4CFDB1A-A5DF-4B07-9E87-D30DEF3E7E1E}" type="datetimeFigureOut">
               <a:rPr lang="en-US" smtClean="0"/>
-              <a:t>8/14/2020</a:t>
+              <a:t>8/21/2020</a:t>
             </a:fld>
             <a:endParaRPr lang="en-US"/>
           </a:p>
@@ -1265,7 +1265,7 @@
           <a:p>
             <a:fld id="{A4CFDB1A-A5DF-4B07-9E87-D30DEF3E7E1E}" type="datetimeFigureOut">
               <a:rPr lang="en-US" smtClean="0"/>
-              <a:t>8/14/2020</a:t>
+              <a:t>8/21/2020</a:t>
             </a:fld>
             <a:endParaRPr lang="en-US"/>
           </a:p>
@@ -1632,7 +1632,7 @@
           <a:p>
             <a:fld id="{A4CFDB1A-A5DF-4B07-9E87-D30DEF3E7E1E}" type="datetimeFigureOut">
               <a:rPr lang="en-US" smtClean="0"/>
-              <a:t>8/14/2020</a:t>
+              <a:t>8/21/2020</a:t>
             </a:fld>
             <a:endParaRPr lang="en-US"/>
           </a:p>
@@ -1750,7 +1750,7 @@
           <a:p>
             <a:fld id="{A4CFDB1A-A5DF-4B07-9E87-D30DEF3E7E1E}" type="datetimeFigureOut">
               <a:rPr lang="en-US" smtClean="0"/>
-              <a:t>8/14/2020</a:t>
+              <a:t>8/21/2020</a:t>
             </a:fld>
             <a:endParaRPr lang="en-US"/>
           </a:p>
@@ -1845,7 +1845,7 @@
           <a:p>
             <a:fld id="{A4CFDB1A-A5DF-4B07-9E87-D30DEF3E7E1E}" type="datetimeFigureOut">
               <a:rPr lang="en-US" smtClean="0"/>
-              <a:t>8/14/2020</a:t>
+              <a:t>8/21/2020</a:t>
             </a:fld>
             <a:endParaRPr lang="en-US"/>
           </a:p>
@@ -2122,7 +2122,7 @@
           <a:p>
             <a:fld id="{A4CFDB1A-A5DF-4B07-9E87-D30DEF3E7E1E}" type="datetimeFigureOut">
               <a:rPr lang="en-US" smtClean="0"/>
-              <a:t>8/14/2020</a:t>
+              <a:t>8/21/2020</a:t>
             </a:fld>
             <a:endParaRPr lang="en-US"/>
           </a:p>
@@ -2379,7 +2379,7 @@
           <a:p>
             <a:fld id="{A4CFDB1A-A5DF-4B07-9E87-D30DEF3E7E1E}" type="datetimeFigureOut">
               <a:rPr lang="en-US" smtClean="0"/>
-              <a:t>8/14/2020</a:t>
+              <a:t>8/21/2020</a:t>
             </a:fld>
             <a:endParaRPr lang="en-US"/>
           </a:p>
@@ -2592,7 +2592,7 @@
           <a:p>
             <a:fld id="{A4CFDB1A-A5DF-4B07-9E87-D30DEF3E7E1E}" type="datetimeFigureOut">
               <a:rPr lang="en-US" smtClean="0"/>
-              <a:t>8/14/2020</a:t>
+              <a:t>8/21/2020</a:t>
             </a:fld>
             <a:endParaRPr lang="en-US"/>
           </a:p>
@@ -3243,7 +3243,7 @@
               </p:nextCondLst>
             </p:seq>
             <p:audio>
-              <p:cMediaNode vol="80000">
+              <p:cMediaNode vol="80000" showWhenStopped="0">
                 <p:cTn id="7" fill="hold" display="0">
                   <p:stCondLst>
                     <p:cond delay="indefinite"/>

</xml_diff>